<commit_message>
Added new how-to screens.
</commit_message>
<xml_diff>
--- a/Images/HowToScreen/HowToScreen.pptx
+++ b/Images/HowToScreen/HowToScreen.pptx
@@ -104,6 +104,11 @@
       </a:defRPr>
     </a:lvl9pPr>
   </p:defaultTextStyle>
+  <p:extLst>
+    <p:ext uri="{EFAFB233-063F-42B5-8137-9DF3F51BA10A}">
+      <p15:sldGuideLst xmlns:p15="http://schemas.microsoft.com/office/powerpoint/2012/main"/>
+    </p:ext>
+  </p:extLst>
 </p:presentation>
 </file>
 
@@ -238,7 +243,7 @@
           <a:p>
             <a:fld id="{89A69224-3B7D-014F-B58A-34C215BF07AA}" type="datetimeFigureOut">
               <a:rPr lang="en-US" smtClean="0"/>
-              <a:t>4/10/16</a:t>
+              <a:t>9/30/16</a:t>
             </a:fld>
             <a:endParaRPr lang="en-US"/>
           </a:p>
@@ -408,7 +413,7 @@
           <a:p>
             <a:fld id="{89A69224-3B7D-014F-B58A-34C215BF07AA}" type="datetimeFigureOut">
               <a:rPr lang="en-US" smtClean="0"/>
-              <a:t>4/10/16</a:t>
+              <a:t>9/30/16</a:t>
             </a:fld>
             <a:endParaRPr lang="en-US"/>
           </a:p>
@@ -588,7 +593,7 @@
           <a:p>
             <a:fld id="{89A69224-3B7D-014F-B58A-34C215BF07AA}" type="datetimeFigureOut">
               <a:rPr lang="en-US" smtClean="0"/>
-              <a:t>4/10/16</a:t>
+              <a:t>9/30/16</a:t>
             </a:fld>
             <a:endParaRPr lang="en-US"/>
           </a:p>
@@ -758,7 +763,7 @@
           <a:p>
             <a:fld id="{89A69224-3B7D-014F-B58A-34C215BF07AA}" type="datetimeFigureOut">
               <a:rPr lang="en-US" smtClean="0"/>
-              <a:t>4/10/16</a:t>
+              <a:t>9/30/16</a:t>
             </a:fld>
             <a:endParaRPr lang="en-US"/>
           </a:p>
@@ -1002,7 +1007,7 @@
           <a:p>
             <a:fld id="{89A69224-3B7D-014F-B58A-34C215BF07AA}" type="datetimeFigureOut">
               <a:rPr lang="en-US" smtClean="0"/>
-              <a:t>4/10/16</a:t>
+              <a:t>9/30/16</a:t>
             </a:fld>
             <a:endParaRPr lang="en-US"/>
           </a:p>
@@ -1234,7 +1239,7 @@
           <a:p>
             <a:fld id="{89A69224-3B7D-014F-B58A-34C215BF07AA}" type="datetimeFigureOut">
               <a:rPr lang="en-US" smtClean="0"/>
-              <a:t>4/10/16</a:t>
+              <a:t>9/30/16</a:t>
             </a:fld>
             <a:endParaRPr lang="en-US"/>
           </a:p>
@@ -1601,7 +1606,7 @@
           <a:p>
             <a:fld id="{89A69224-3B7D-014F-B58A-34C215BF07AA}" type="datetimeFigureOut">
               <a:rPr lang="en-US" smtClean="0"/>
-              <a:t>4/10/16</a:t>
+              <a:t>9/30/16</a:t>
             </a:fld>
             <a:endParaRPr lang="en-US"/>
           </a:p>
@@ -1719,7 +1724,7 @@
           <a:p>
             <a:fld id="{89A69224-3B7D-014F-B58A-34C215BF07AA}" type="datetimeFigureOut">
               <a:rPr lang="en-US" smtClean="0"/>
-              <a:t>4/10/16</a:t>
+              <a:t>9/30/16</a:t>
             </a:fld>
             <a:endParaRPr lang="en-US"/>
           </a:p>
@@ -1814,7 +1819,7 @@
           <a:p>
             <a:fld id="{89A69224-3B7D-014F-B58A-34C215BF07AA}" type="datetimeFigureOut">
               <a:rPr lang="en-US" smtClean="0"/>
-              <a:t>4/10/16</a:t>
+              <a:t>9/30/16</a:t>
             </a:fld>
             <a:endParaRPr lang="en-US"/>
           </a:p>
@@ -2091,7 +2096,7 @@
           <a:p>
             <a:fld id="{89A69224-3B7D-014F-B58A-34C215BF07AA}" type="datetimeFigureOut">
               <a:rPr lang="en-US" smtClean="0"/>
-              <a:t>4/10/16</a:t>
+              <a:t>9/30/16</a:t>
             </a:fld>
             <a:endParaRPr lang="en-US"/>
           </a:p>
@@ -2348,7 +2353,7 @@
           <a:p>
             <a:fld id="{89A69224-3B7D-014F-B58A-34C215BF07AA}" type="datetimeFigureOut">
               <a:rPr lang="en-US" smtClean="0"/>
-              <a:t>4/10/16</a:t>
+              <a:t>9/30/16</a:t>
             </a:fld>
             <a:endParaRPr lang="en-US"/>
           </a:p>
@@ -2561,7 +2566,7 @@
           <a:p>
             <a:fld id="{89A69224-3B7D-014F-B58A-34C215BF07AA}" type="datetimeFigureOut">
               <a:rPr lang="en-US" smtClean="0"/>
-              <a:t>4/10/16</a:t>
+              <a:t>9/30/16</a:t>
             </a:fld>
             <a:endParaRPr lang="en-US"/>
           </a:p>
@@ -2976,7 +2981,7 @@
       </p:grpSpPr>
       <p:pic>
         <p:nvPicPr>
-          <p:cNvPr id="26" name="Picture 25"/>
+          <p:cNvPr id="14" name="Picture 13"/>
           <p:cNvPicPr>
             <a:picLocks noChangeAspect="1"/>
           </p:cNvPicPr>
@@ -2996,131 +3001,17 @@
         </p:blipFill>
         <p:spPr>
           <a:xfrm>
-            <a:off x="3094074" y="1337280"/>
-            <a:ext cx="1615966" cy="1360814"/>
+            <a:off x="3020836" y="4729361"/>
+            <a:ext cx="1783707" cy="3172621"/>
           </a:xfrm>
           <a:prstGeom prst="rect">
             <a:avLst/>
           </a:prstGeom>
         </p:spPr>
       </p:pic>
-      <p:sp>
-        <p:nvSpPr>
-          <p:cNvPr id="5" name="TextBox 4"/>
-          <p:cNvSpPr txBox="1"/>
-          <p:nvPr/>
-        </p:nvSpPr>
-        <p:spPr>
-          <a:xfrm>
-            <a:off x="410482" y="1867944"/>
-            <a:ext cx="2561077" cy="523220"/>
-          </a:xfrm>
-          <a:prstGeom prst="rect">
-            <a:avLst/>
-          </a:prstGeom>
-          <a:noFill/>
-          <a:ln>
-            <a:noFill/>
-          </a:ln>
-        </p:spPr>
-        <p:style>
-          <a:lnRef idx="2">
-            <a:schemeClr val="accent2"/>
-          </a:lnRef>
-          <a:fillRef idx="1">
-            <a:schemeClr val="lt1"/>
-          </a:fillRef>
-          <a:effectRef idx="0">
-            <a:schemeClr val="accent2"/>
-          </a:effectRef>
-          <a:fontRef idx="minor">
-            <a:schemeClr val="dk1"/>
-          </a:fontRef>
-        </p:style>
-        <p:txBody>
-          <a:bodyPr wrap="square" rtlCol="0">
-            <a:spAutoFit/>
-          </a:bodyPr>
-          <a:lstStyle/>
-          <a:p>
-            <a:r>
-              <a:rPr lang="en-US" sz="1400" dirty="0" smtClean="0">
-                <a:solidFill>
-                  <a:schemeClr val="bg1"/>
-                </a:solidFill>
-                <a:latin typeface="Copperplate" charset="0"/>
-              </a:rPr>
-              <a:t>Swipe the letters in any direction to form words:</a:t>
-            </a:r>
-            <a:endParaRPr lang="en-US" sz="1400" dirty="0">
-              <a:solidFill>
-                <a:schemeClr val="bg1"/>
-              </a:solidFill>
-              <a:latin typeface="Copperplate" charset="0"/>
-            </a:endParaRPr>
-          </a:p>
-        </p:txBody>
-      </p:sp>
-      <p:sp>
-        <p:nvSpPr>
-          <p:cNvPr id="6" name="TextBox 5"/>
-          <p:cNvSpPr txBox="1"/>
-          <p:nvPr/>
-        </p:nvSpPr>
-        <p:spPr>
-          <a:xfrm>
-            <a:off x="410482" y="687213"/>
-            <a:ext cx="4191712" cy="738664"/>
-          </a:xfrm>
-          <a:prstGeom prst="rect">
-            <a:avLst/>
-          </a:prstGeom>
-          <a:noFill/>
-          <a:ln>
-            <a:noFill/>
-          </a:ln>
-        </p:spPr>
-        <p:style>
-          <a:lnRef idx="2">
-            <a:schemeClr val="accent2"/>
-          </a:lnRef>
-          <a:fillRef idx="1">
-            <a:schemeClr val="lt1"/>
-          </a:fillRef>
-          <a:effectRef idx="0">
-            <a:schemeClr val="accent2"/>
-          </a:effectRef>
-          <a:fontRef idx="minor">
-            <a:schemeClr val="dk1"/>
-          </a:fontRef>
-        </p:style>
-        <p:txBody>
-          <a:bodyPr wrap="square" rtlCol="0">
-            <a:spAutoFit/>
-          </a:bodyPr>
-          <a:lstStyle/>
-          <a:p>
-            <a:r>
-              <a:rPr lang="en-US" sz="1400" dirty="0" smtClean="0">
-                <a:solidFill>
-                  <a:schemeClr val="bg1"/>
-                </a:solidFill>
-                <a:latin typeface="Copperplate" charset="0"/>
-              </a:rPr>
-              <a:t>Keep the letters form reaching the top of the screen by forming words, which will eliminate the pieces.</a:t>
-            </a:r>
-            <a:endParaRPr lang="en-US" sz="1400" dirty="0">
-              <a:solidFill>
-                <a:schemeClr val="bg1"/>
-              </a:solidFill>
-              <a:latin typeface="Copperplate" charset="0"/>
-            </a:endParaRPr>
-          </a:p>
-        </p:txBody>
-      </p:sp>
       <p:pic>
         <p:nvPicPr>
-          <p:cNvPr id="9" name="Picture 8"/>
+          <p:cNvPr id="26" name="Picture 25"/>
           <p:cNvPicPr>
             <a:picLocks noChangeAspect="1"/>
           </p:cNvPicPr>
@@ -3140,14 +3031,128 @@
         </p:blipFill>
         <p:spPr>
           <a:xfrm>
-            <a:off x="2998381" y="4795739"/>
-            <a:ext cx="1807352" cy="3214678"/>
+            <a:off x="3094074" y="1337280"/>
+            <a:ext cx="1615966" cy="1360814"/>
           </a:xfrm>
           <a:prstGeom prst="rect">
             <a:avLst/>
           </a:prstGeom>
         </p:spPr>
       </p:pic>
+      <p:sp>
+        <p:nvSpPr>
+          <p:cNvPr id="5" name="TextBox 4"/>
+          <p:cNvSpPr txBox="1"/>
+          <p:nvPr/>
+        </p:nvSpPr>
+        <p:spPr>
+          <a:xfrm>
+            <a:off x="410482" y="1867944"/>
+            <a:ext cx="2561077" cy="523220"/>
+          </a:xfrm>
+          <a:prstGeom prst="rect">
+            <a:avLst/>
+          </a:prstGeom>
+          <a:noFill/>
+          <a:ln>
+            <a:noFill/>
+          </a:ln>
+        </p:spPr>
+        <p:style>
+          <a:lnRef idx="2">
+            <a:schemeClr val="accent2"/>
+          </a:lnRef>
+          <a:fillRef idx="1">
+            <a:schemeClr val="lt1"/>
+          </a:fillRef>
+          <a:effectRef idx="0">
+            <a:schemeClr val="accent2"/>
+          </a:effectRef>
+          <a:fontRef idx="minor">
+            <a:schemeClr val="dk1"/>
+          </a:fontRef>
+        </p:style>
+        <p:txBody>
+          <a:bodyPr wrap="square" rtlCol="0">
+            <a:spAutoFit/>
+          </a:bodyPr>
+          <a:lstStyle/>
+          <a:p>
+            <a:r>
+              <a:rPr lang="en-US" sz="1400" dirty="0" smtClean="0">
+                <a:solidFill>
+                  <a:schemeClr val="bg1"/>
+                </a:solidFill>
+                <a:latin typeface="Copperplate" charset="0"/>
+              </a:rPr>
+              <a:t>Swipe the letters in any direction to form words:</a:t>
+            </a:r>
+            <a:endParaRPr lang="en-US" sz="1400" dirty="0">
+              <a:solidFill>
+                <a:schemeClr val="bg1"/>
+              </a:solidFill>
+              <a:latin typeface="Copperplate" charset="0"/>
+            </a:endParaRPr>
+          </a:p>
+        </p:txBody>
+      </p:sp>
+      <p:sp>
+        <p:nvSpPr>
+          <p:cNvPr id="6" name="TextBox 5"/>
+          <p:cNvSpPr txBox="1"/>
+          <p:nvPr/>
+        </p:nvSpPr>
+        <p:spPr>
+          <a:xfrm>
+            <a:off x="410482" y="687213"/>
+            <a:ext cx="4191712" cy="738664"/>
+          </a:xfrm>
+          <a:prstGeom prst="rect">
+            <a:avLst/>
+          </a:prstGeom>
+          <a:noFill/>
+          <a:ln>
+            <a:noFill/>
+          </a:ln>
+        </p:spPr>
+        <p:style>
+          <a:lnRef idx="2">
+            <a:schemeClr val="accent2"/>
+          </a:lnRef>
+          <a:fillRef idx="1">
+            <a:schemeClr val="lt1"/>
+          </a:fillRef>
+          <a:effectRef idx="0">
+            <a:schemeClr val="accent2"/>
+          </a:effectRef>
+          <a:fontRef idx="minor">
+            <a:schemeClr val="dk1"/>
+          </a:fontRef>
+        </p:style>
+        <p:txBody>
+          <a:bodyPr wrap="square" rtlCol="0">
+            <a:spAutoFit/>
+          </a:bodyPr>
+          <a:lstStyle/>
+          <a:p>
+            <a:r>
+              <a:rPr lang="en-US" sz="1400" dirty="0" smtClean="0">
+                <a:solidFill>
+                  <a:schemeClr val="bg1"/>
+                </a:solidFill>
+                <a:latin typeface="Copperplate" charset="0"/>
+              </a:rPr>
+              <a:t>Keep the letters form reaching the top of the screen by forming words, which will eliminate the pieces.</a:t>
+            </a:r>
+            <a:endParaRPr lang="en-US" sz="1400" dirty="0">
+              <a:solidFill>
+                <a:schemeClr val="bg1"/>
+              </a:solidFill>
+              <a:latin typeface="Copperplate" charset="0"/>
+            </a:endParaRPr>
+          </a:p>
+        </p:txBody>
+      </p:sp>
       <p:cxnSp>
         <p:nvCxnSpPr>
           <p:cNvPr id="11" name="Straight Arrow Connector 10"/>
@@ -3234,7 +3239,7 @@
           <p:nvPr/>
         </p:nvPicPr>
         <p:blipFill>
-          <a:blip r:embed="rId2">
+          <a:blip r:embed="rId3">
             <a:extLst>
               <a:ext uri="{28A0092B-C50C-407E-A947-70E740481C1C}">
                 <a14:useLocalDpi xmlns:a14="http://schemas.microsoft.com/office/drawing/2010/main" val="0"/>
@@ -3850,8 +3855,8 @@
         </p:nvSpPr>
         <p:spPr>
           <a:xfrm>
-            <a:off x="410482" y="4597242"/>
-            <a:ext cx="2385882" cy="1600438"/>
+            <a:off x="409405" y="4338113"/>
+            <a:ext cx="2385882" cy="2462213"/>
           </a:xfrm>
           <a:prstGeom prst="rect">
             <a:avLst/>
@@ -3888,7 +3893,16 @@
                 </a:solidFill>
                 <a:latin typeface="Copperplate" charset="0"/>
               </a:rPr>
-              <a:t>Advance to new levels by forming words in the top boxes from letters in the white squares. The formed word must be of the word type (word, noun, verb, etc.).</a:t>
+              <a:t>Advance to new levels </a:t>
+            </a:r>
+            <a:r>
+              <a:rPr lang="en-US" sz="1400" dirty="0" smtClean="0">
+                <a:solidFill>
+                  <a:schemeClr val="bg1"/>
+                </a:solidFill>
+                <a:latin typeface="Copperplate" charset="0"/>
+              </a:rPr>
+              <a:t>by eliminating all letters in the top bar. This is done by forming words with the white boxes – when a word is formed, any letters in the white boxes will knock out one or more matching letters on Top.</a:t>
             </a:r>
             <a:endParaRPr lang="en-US" sz="1400" dirty="0">
               <a:solidFill>
@@ -3907,8 +3921,8 @@
         </p:nvCxnSpPr>
         <p:spPr>
           <a:xfrm flipV="1">
-            <a:off x="3457613" y="5328021"/>
-            <a:ext cx="83128" cy="1611974"/>
+            <a:off x="3232519" y="5068357"/>
+            <a:ext cx="291744" cy="1386007"/>
           </a:xfrm>
           <a:prstGeom prst="straightConnector1">
             <a:avLst/>
@@ -3950,9 +3964,9 @@
           <p:nvPr/>
         </p:nvCxnSpPr>
         <p:spPr>
-          <a:xfrm>
-            <a:off x="2643441" y="5328021"/>
-            <a:ext cx="354940" cy="0"/>
+          <a:xfrm flipV="1">
+            <a:off x="2699670" y="4986670"/>
+            <a:ext cx="394404" cy="6302"/>
           </a:xfrm>
           <a:prstGeom prst="straightConnector1">
             <a:avLst/>
@@ -3995,7 +4009,7 @@
         </p:nvSpPr>
         <p:spPr>
           <a:xfrm>
-            <a:off x="449844" y="6659610"/>
+            <a:off x="409405" y="6947875"/>
             <a:ext cx="2561077" cy="954107"/>
           </a:xfrm>
           <a:prstGeom prst="rect">
@@ -4155,8 +4169,8 @@
         </p:nvCxnSpPr>
         <p:spPr>
           <a:xfrm>
-            <a:off x="1730382" y="7472216"/>
-            <a:ext cx="1939370" cy="342714"/>
+            <a:off x="2632531" y="7750283"/>
+            <a:ext cx="786526" cy="5415"/>
           </a:xfrm>
           <a:prstGeom prst="straightConnector1">
             <a:avLst/>

</xml_diff>